<commit_message>
# Presentacion.pptx (Typo change)
</commit_message>
<xml_diff>
--- a/docs/Reuniones/Sprint 1/Sprint 1 - Formal/Presentacion.pptx
+++ b/docs/Reuniones/Sprint 1/Sprint 1 - Formal/Presentacion.pptx
@@ -117,6 +117,22 @@
       </a:defRPr>
     </a:lvl9pPr>
   </p:defaultTextStyle>
+  <p:extLst>
+    <p:ext uri="{EFAFB233-063F-42B5-8137-9DF3F51BA10A}">
+      <p15:sldGuideLst xmlns:p15="http://schemas.microsoft.com/office/powerpoint/2012/main">
+        <p15:guide id="1" orient="horz" pos="2160">
+          <p15:clr>
+            <a:srgbClr val="A4A3A4"/>
+          </p15:clr>
+        </p15:guide>
+        <p15:guide id="2" pos="2880">
+          <p15:clr>
+            <a:srgbClr val="A4A3A4"/>
+          </p15:clr>
+        </p15:guide>
+      </p15:sldGuideLst>
+    </p:ext>
+  </p:extLst>
 </p:presentation>
 </file>
 
@@ -337,7 +353,7 @@
             <a:fld id="{5D54C5B7-6535-45F6-B87D-0A10CE9C57BD}" type="slidenum">
               <a:rPr lang="es-AR" smtClean="0"/>
               <a:pPr/>
-              <a:t>‹Nº›</a:t>
+              <a:t>‹#›</a:t>
             </a:fld>
             <a:endParaRPr lang="es-AR"/>
           </a:p>
@@ -504,7 +520,7 @@
             <a:fld id="{5D54C5B7-6535-45F6-B87D-0A10CE9C57BD}" type="slidenum">
               <a:rPr lang="es-AR" smtClean="0"/>
               <a:pPr/>
-              <a:t>‹Nº›</a:t>
+              <a:t>‹#›</a:t>
             </a:fld>
             <a:endParaRPr lang="es-AR"/>
           </a:p>
@@ -681,7 +697,7 @@
             <a:fld id="{5D54C5B7-6535-45F6-B87D-0A10CE9C57BD}" type="slidenum">
               <a:rPr lang="es-AR" smtClean="0"/>
               <a:pPr/>
-              <a:t>‹Nº›</a:t>
+              <a:t>‹#›</a:t>
             </a:fld>
             <a:endParaRPr lang="es-AR"/>
           </a:p>
@@ -848,7 +864,7 @@
             <a:fld id="{5D54C5B7-6535-45F6-B87D-0A10CE9C57BD}" type="slidenum">
               <a:rPr lang="es-AR" smtClean="0"/>
               <a:pPr/>
-              <a:t>‹Nº›</a:t>
+              <a:t>‹#›</a:t>
             </a:fld>
             <a:endParaRPr lang="es-AR"/>
           </a:p>
@@ -1092,7 +1108,7 @@
             <a:fld id="{5D54C5B7-6535-45F6-B87D-0A10CE9C57BD}" type="slidenum">
               <a:rPr lang="es-AR" smtClean="0"/>
               <a:pPr/>
-              <a:t>‹Nº›</a:t>
+              <a:t>‹#›</a:t>
             </a:fld>
             <a:endParaRPr lang="es-AR"/>
           </a:p>
@@ -1358,7 +1374,7 @@
             <a:fld id="{5D54C5B7-6535-45F6-B87D-0A10CE9C57BD}" type="slidenum">
               <a:rPr lang="es-AR" smtClean="0"/>
               <a:pPr/>
-              <a:t>‹Nº›</a:t>
+              <a:t>‹#›</a:t>
             </a:fld>
             <a:endParaRPr lang="es-AR"/>
           </a:p>
@@ -1738,7 +1754,7 @@
             <a:fld id="{5D54C5B7-6535-45F6-B87D-0A10CE9C57BD}" type="slidenum">
               <a:rPr lang="es-AR" smtClean="0"/>
               <a:pPr/>
-              <a:t>‹Nº›</a:t>
+              <a:t>‹#›</a:t>
             </a:fld>
             <a:endParaRPr lang="es-AR"/>
           </a:p>
@@ -1890,7 +1906,7 @@
             <a:fld id="{5D54C5B7-6535-45F6-B87D-0A10CE9C57BD}" type="slidenum">
               <a:rPr lang="es-AR" smtClean="0"/>
               <a:pPr/>
-              <a:t>‹Nº›</a:t>
+              <a:t>‹#›</a:t>
             </a:fld>
             <a:endParaRPr lang="es-AR"/>
           </a:p>
@@ -1982,7 +1998,7 @@
             <a:fld id="{5D54C5B7-6535-45F6-B87D-0A10CE9C57BD}" type="slidenum">
               <a:rPr lang="es-AR" smtClean="0"/>
               <a:pPr/>
-              <a:t>‹Nº›</a:t>
+              <a:t>‹#›</a:t>
             </a:fld>
             <a:endParaRPr lang="es-AR"/>
           </a:p>
@@ -2245,7 +2261,7 @@
             <a:fld id="{5D54C5B7-6535-45F6-B87D-0A10CE9C57BD}" type="slidenum">
               <a:rPr lang="es-AR" smtClean="0"/>
               <a:pPr/>
-              <a:t>‹Nº›</a:t>
+              <a:t>‹#›</a:t>
             </a:fld>
             <a:endParaRPr lang="es-AR"/>
           </a:p>
@@ -2540,7 +2556,7 @@
             <a:fld id="{5D54C5B7-6535-45F6-B87D-0A10CE9C57BD}" type="slidenum">
               <a:rPr lang="es-AR" smtClean="0"/>
               <a:pPr/>
-              <a:t>‹Nº›</a:t>
+              <a:t>‹#›</a:t>
             </a:fld>
             <a:endParaRPr lang="es-AR"/>
           </a:p>
@@ -3344,7 +3360,7 @@
             <a:fld id="{5D54C5B7-6535-45F6-B87D-0A10CE9C57BD}" type="slidenum">
               <a:rPr lang="es-AR" smtClean="0"/>
               <a:pPr/>
-              <a:t>‹Nº›</a:t>
+              <a:t>‹#›</a:t>
             </a:fld>
             <a:endParaRPr lang="es-AR"/>
           </a:p>
@@ -4041,6 +4057,13 @@
   <p:clrMapOvr>
     <a:masterClrMapping/>
   </p:clrMapOvr>
+  <p:timing>
+    <p:tnLst>
+      <p:par>
+        <p:cTn id="1" dur="indefinite" restart="never" nodeType="tmRoot"/>
+      </p:par>
+    </p:tnLst>
+  </p:timing>
 </p:sld>
 </file>
 
@@ -4220,11 +4243,7 @@
           <a:p>
             <a:r>
               <a:rPr lang="es-AR" dirty="0" smtClean="0"/>
-              <a:t>Se escribieron y corrieron pruebas </a:t>
-            </a:r>
-            <a:r>
-              <a:rPr lang="es-AR" dirty="0" smtClean="0"/>
-              <a:t>funcionales.</a:t>
+              <a:t>Se escribieron y corrieron pruebas funcionales.</a:t>
             </a:r>
           </a:p>
           <a:p>
@@ -4232,7 +4251,6 @@
               <a:rPr lang="es-AR" dirty="0" smtClean="0"/>
               <a:t>Plantilla de prueba funcional:</a:t>
             </a:r>
-            <a:endParaRPr lang="es-AR" dirty="0" smtClean="0"/>
           </a:p>
           <a:p>
             <a:pPr>
@@ -4242,7 +4260,6 @@
               <a:rPr lang="es-AR" sz="2800" b="1" i="1" dirty="0" smtClean="0"/>
               <a:t>Prueba N</a:t>
             </a:r>
-            <a:endParaRPr lang="es-AR" sz="2800" b="1" i="1" dirty="0" smtClean="0"/>
           </a:p>
           <a:p>
             <a:pPr>
@@ -4250,17 +4267,8 @@
             </a:pPr>
             <a:r>
               <a:rPr lang="es-AR" sz="2800" i="1" dirty="0" smtClean="0"/>
-              <a:t>	</a:t>
-            </a:r>
-            <a:r>
-              <a:rPr lang="es-AR" sz="2800" i="1" dirty="0" smtClean="0"/>
-              <a:t>&lt;</a:t>
-            </a:r>
-            <a:r>
-              <a:rPr lang="es-AR" sz="2800" i="1" dirty="0" smtClean="0"/>
-              <a:t>Contexto de la prueba&gt;.</a:t>
-            </a:r>
-            <a:endParaRPr lang="es-AR" sz="2800" i="1" dirty="0" smtClean="0"/>
+              <a:t>	&lt;Contexto de la prueba&gt;.</a:t>
+            </a:r>
           </a:p>
           <a:p>
             <a:pPr>
@@ -4278,7 +4286,6 @@
               <a:rPr lang="es-AR" i="1" dirty="0" smtClean="0"/>
               <a:t>&lt;Criterios de aceptación&gt;</a:t>
             </a:r>
-            <a:endParaRPr lang="es-AR" i="1" dirty="0" smtClean="0"/>
           </a:p>
           <a:p>
             <a:pPr>
@@ -4286,13 +4293,8 @@
             </a:pPr>
             <a:r>
               <a:rPr lang="es-AR" sz="2800" b="1" i="1" dirty="0" smtClean="0"/>
-              <a:t>Pasos</a:t>
-            </a:r>
-            <a:r>
-              <a:rPr lang="es-AR" sz="2800" b="1" i="1" dirty="0" smtClean="0"/>
-              <a:t>:</a:t>
-            </a:r>
-            <a:endParaRPr lang="es-AR" sz="2800" b="1" i="1" dirty="0" smtClean="0"/>
+              <a:t>Pasos:</a:t>
+            </a:r>
           </a:p>
           <a:p>
             <a:pPr lvl="1"/>
@@ -4300,7 +4302,6 @@
               <a:rPr lang="es-AR" i="1" dirty="0" smtClean="0"/>
               <a:t>&lt;Pasos para realizar la prueba&gt;</a:t>
             </a:r>
-            <a:endParaRPr lang="es-AR" i="1" dirty="0" smtClean="0"/>
           </a:p>
           <a:p>
             <a:endParaRPr lang="es-AR" dirty="0"/>
@@ -4400,11 +4401,7 @@
           <a:p>
             <a:r>
               <a:rPr lang="es-AR" dirty="0" smtClean="0"/>
-              <a:t>Estado de la prueba por f</a:t>
-            </a:r>
-            <a:r>
-              <a:rPr lang="es-AR" dirty="0" smtClean="0"/>
-              <a:t>echa de realización.</a:t>
+              <a:t>Estado de la prueba por fecha de realización.</a:t>
             </a:r>
           </a:p>
           <a:p>
@@ -4416,7 +4413,6 @@
               <a:rPr lang="es-AR" dirty="0" smtClean="0"/>
               <a:t> encontrados en la corrida.</a:t>
             </a:r>
-            <a:endParaRPr lang="es-AR" dirty="0" smtClean="0"/>
           </a:p>
           <a:p>
             <a:endParaRPr lang="es-AR" dirty="0" smtClean="0"/>
@@ -4741,6 +4737,13 @@
   <p:clrMapOvr>
     <a:masterClrMapping/>
   </p:clrMapOvr>
+  <p:timing>
+    <p:tnLst>
+      <p:par>
+        <p:cTn id="1" dur="indefinite" restart="never" nodeType="tmRoot"/>
+      </p:par>
+    </p:tnLst>
+  </p:timing>
 </p:sld>
 </file>
 
@@ -4825,6 +4828,13 @@
   <p:clrMapOvr>
     <a:masterClrMapping/>
   </p:clrMapOvr>
+  <p:timing>
+    <p:tnLst>
+      <p:par>
+        <p:cTn id="1" dur="indefinite" restart="never" nodeType="tmRoot"/>
+      </p:par>
+    </p:tnLst>
+  </p:timing>
 </p:sld>
 </file>
 
@@ -4942,6 +4952,13 @@
   <p:clrMapOvr>
     <a:masterClrMapping/>
   </p:clrMapOvr>
+  <p:timing>
+    <p:tnLst>
+      <p:par>
+        <p:cTn id="1" dur="indefinite" restart="never" nodeType="tmRoot"/>
+      </p:par>
+    </p:tnLst>
+  </p:timing>
 </p:sld>
 </file>
 
@@ -4985,7 +5002,11 @@
             <a:pPr algn="ctr"/>
             <a:r>
               <a:rPr lang="es-AR" dirty="0" smtClean="0"/>
-              <a:t>Sprint 1 – Análisis de Riesgo</a:t>
+              <a:t>Sprint 1 – Análisis de </a:t>
+            </a:r>
+            <a:r>
+              <a:rPr lang="es-AR" dirty="0" smtClean="0"/>
+              <a:t>Riesgos</a:t>
             </a:r>
             <a:endParaRPr lang="es-AR" dirty="0"/>
           </a:p>
@@ -5013,7 +5034,15 @@
           <a:p>
             <a:r>
               <a:rPr lang="es-AR" dirty="0" smtClean="0"/>
-              <a:t>Se realizó un análisis de riesgo inicial</a:t>
+              <a:t>Se realizó un análisis de </a:t>
+            </a:r>
+            <a:r>
+              <a:rPr lang="es-AR" dirty="0" smtClean="0"/>
+              <a:t>riesgos </a:t>
+            </a:r>
+            <a:r>
+              <a:rPr lang="es-AR" dirty="0" smtClean="0"/>
+              <a:t>inicial</a:t>
             </a:r>
             <a:endParaRPr lang="es-AR" dirty="0"/>
           </a:p>
@@ -5029,7 +5058,7 @@
           <a:blip r:embed="rId2">
             <a:extLst>
               <a:ext uri="{28A0092B-C50C-407E-A947-70E740481C1C}">
-                <a14:useLocalDpi xmlns:lc="http://schemas.openxmlformats.org/drawingml/2006/lockedCanvas" xmlns:pic="http://schemas.openxmlformats.org/drawingml/2006/picture" xmlns:a14="http://schemas.microsoft.com/office/drawing/2010/main" xmlns:wps="http://schemas.microsoft.com/office/word/2010/wordprocessingShape" xmlns:wne="http://schemas.microsoft.com/office/word/2006/wordml" xmlns:wpi="http://schemas.microsoft.com/office/word/2010/wordprocessingInk" xmlns:wpg="http://schemas.microsoft.com/office/word/2010/wordprocessingGroup" xmlns:w14="http://schemas.microsoft.com/office/word/2010/wordml" xmlns:w="http://schemas.openxmlformats.org/wordprocessingml/2006/main" xmlns:w10="urn:schemas-microsoft-com:office:word" xmlns:wp="http://schemas.openxmlformats.org/drawingml/2006/wordprocessingDrawing" xmlns:wp14="http://schemas.microsoft.com/office/word/2010/wordprocessingDrawing" xmlns:v="urn:schemas-microsoft-com:vml" xmlns:m="http://schemas.openxmlformats.org/officeDocument/2006/math" xmlns:o="urn:schemas-microsoft-com:office:office" xmlns:mc="http://schemas.openxmlformats.org/markup-compatibility/2006" xmlns:wpc="http://schemas.microsoft.com/office/word/2010/wordprocessingCanvas" xmlns="" val="0"/>
+                <a14:useLocalDpi xmlns:a14="http://schemas.microsoft.com/office/drawing/2010/main" val="0"/>
               </a:ext>
             </a:extLst>
           </a:blip>
@@ -5057,6 +5086,13 @@
   <p:clrMapOvr>
     <a:masterClrMapping/>
   </p:clrMapOvr>
+  <p:timing>
+    <p:tnLst>
+      <p:par>
+        <p:cTn id="1" dur="indefinite" restart="never" nodeType="tmRoot"/>
+      </p:par>
+    </p:tnLst>
+  </p:timing>
 </p:sld>
 </file>
 

</xml_diff>

<commit_message>
[PT-19] Presentacion.pptx with result of the functional tests
</commit_message>
<xml_diff>
--- a/docs/Reuniones/Sprint 1/Sprint 1 - Formal/Presentacion.pptx
+++ b/docs/Reuniones/Sprint 1/Sprint 1 - Formal/Presentacion.pptx
@@ -115,7 +115,7 @@
   </p:defaultTextStyle>
   <p:extLst>
     <p:ext uri="{EFAFB233-063F-42B5-8137-9DF3F51BA10A}">
-      <p15:sldGuideLst xmlns:p15="http://schemas.microsoft.com/office/powerpoint/2012/main">
+      <p15:sldGuideLst xmlns:p15="http://schemas.microsoft.com/office/powerpoint/2012/main" xmlns="">
         <p15:guide id="1" orient="horz" pos="2160">
           <p15:clr>
             <a:srgbClr val="A4A3A4"/>
@@ -333,7 +333,7 @@
             <a:fld id="{37257250-85BF-4CE9-8829-60D0CC99FEAA}" type="datetimeFigureOut">
               <a:rPr lang="es-AR" smtClean="0"/>
               <a:pPr/>
-              <a:t>15/09/2013</a:t>
+              <a:t>16/09/2013</a:t>
             </a:fld>
             <a:endParaRPr lang="es-AR"/>
           </a:p>
@@ -396,7 +396,7 @@
             <a:fld id="{5D54C5B7-6535-45F6-B87D-0A10CE9C57BD}" type="slidenum">
               <a:rPr lang="es-AR" smtClean="0"/>
               <a:pPr/>
-              <a:t>‹#›</a:t>
+              <a:t>‹Nº›</a:t>
             </a:fld>
             <a:endParaRPr lang="es-AR"/>
           </a:p>
@@ -405,7 +405,7 @@
     </p:spTree>
     <p:extLst>
       <p:ext uri="{BB962C8B-B14F-4D97-AF65-F5344CB8AC3E}">
-        <p14:creationId xmlns:p14="http://schemas.microsoft.com/office/powerpoint/2010/main" val="2387916325"/>
+        <p14:creationId xmlns:p14="http://schemas.microsoft.com/office/powerpoint/2010/main" xmlns="" val="2387916325"/>
       </p:ext>
     </p:extLst>
   </p:cSld>
@@ -525,7 +525,7 @@
             <a:fld id="{37257250-85BF-4CE9-8829-60D0CC99FEAA}" type="datetimeFigureOut">
               <a:rPr lang="es-AR" smtClean="0"/>
               <a:pPr/>
-              <a:t>15/09/2013</a:t>
+              <a:t>16/09/2013</a:t>
             </a:fld>
             <a:endParaRPr lang="es-AR"/>
           </a:p>
@@ -568,7 +568,7 @@
             <a:fld id="{5D54C5B7-6535-45F6-B87D-0A10CE9C57BD}" type="slidenum">
               <a:rPr lang="es-AR" smtClean="0"/>
               <a:pPr/>
-              <a:t>‹#›</a:t>
+              <a:t>‹Nº›</a:t>
             </a:fld>
             <a:endParaRPr lang="es-AR"/>
           </a:p>
@@ -577,7 +577,7 @@
     </p:spTree>
     <p:extLst>
       <p:ext uri="{BB962C8B-B14F-4D97-AF65-F5344CB8AC3E}">
-        <p14:creationId xmlns:p14="http://schemas.microsoft.com/office/powerpoint/2010/main" val="599926953"/>
+        <p14:creationId xmlns:p14="http://schemas.microsoft.com/office/powerpoint/2010/main" xmlns="" val="599926953"/>
       </p:ext>
     </p:extLst>
   </p:cSld>
@@ -707,7 +707,7 @@
             <a:fld id="{37257250-85BF-4CE9-8829-60D0CC99FEAA}" type="datetimeFigureOut">
               <a:rPr lang="es-AR" smtClean="0"/>
               <a:pPr/>
-              <a:t>15/09/2013</a:t>
+              <a:t>16/09/2013</a:t>
             </a:fld>
             <a:endParaRPr lang="es-AR"/>
           </a:p>
@@ -750,7 +750,7 @@
             <a:fld id="{5D54C5B7-6535-45F6-B87D-0A10CE9C57BD}" type="slidenum">
               <a:rPr lang="es-AR" smtClean="0"/>
               <a:pPr/>
-              <a:t>‹#›</a:t>
+              <a:t>‹Nº›</a:t>
             </a:fld>
             <a:endParaRPr lang="es-AR"/>
           </a:p>
@@ -759,7 +759,7 @@
     </p:spTree>
     <p:extLst>
       <p:ext uri="{BB962C8B-B14F-4D97-AF65-F5344CB8AC3E}">
-        <p14:creationId xmlns:p14="http://schemas.microsoft.com/office/powerpoint/2010/main" val="1132530867"/>
+        <p14:creationId xmlns:p14="http://schemas.microsoft.com/office/powerpoint/2010/main" xmlns="" val="1132530867"/>
       </p:ext>
     </p:extLst>
   </p:cSld>
@@ -879,7 +879,7 @@
             <a:fld id="{37257250-85BF-4CE9-8829-60D0CC99FEAA}" type="datetimeFigureOut">
               <a:rPr lang="es-AR" smtClean="0"/>
               <a:pPr/>
-              <a:t>15/09/2013</a:t>
+              <a:t>16/09/2013</a:t>
             </a:fld>
             <a:endParaRPr lang="es-AR"/>
           </a:p>
@@ -922,7 +922,7 @@
             <a:fld id="{5D54C5B7-6535-45F6-B87D-0A10CE9C57BD}" type="slidenum">
               <a:rPr lang="es-AR" smtClean="0"/>
               <a:pPr/>
-              <a:t>‹#›</a:t>
+              <a:t>‹Nº›</a:t>
             </a:fld>
             <a:endParaRPr lang="es-AR"/>
           </a:p>
@@ -931,7 +931,7 @@
     </p:spTree>
     <p:extLst>
       <p:ext uri="{BB962C8B-B14F-4D97-AF65-F5344CB8AC3E}">
-        <p14:creationId xmlns:p14="http://schemas.microsoft.com/office/powerpoint/2010/main" val="3486428753"/>
+        <p14:creationId xmlns:p14="http://schemas.microsoft.com/office/powerpoint/2010/main" xmlns="" val="3486428753"/>
       </p:ext>
     </p:extLst>
   </p:cSld>
@@ -1137,7 +1137,7 @@
             <a:fld id="{37257250-85BF-4CE9-8829-60D0CC99FEAA}" type="datetimeFigureOut">
               <a:rPr lang="es-AR" smtClean="0"/>
               <a:pPr/>
-              <a:t>15/09/2013</a:t>
+              <a:t>16/09/2013</a:t>
             </a:fld>
             <a:endParaRPr lang="es-AR"/>
           </a:p>
@@ -1180,7 +1180,7 @@
             <a:fld id="{5D54C5B7-6535-45F6-B87D-0A10CE9C57BD}" type="slidenum">
               <a:rPr lang="es-AR" smtClean="0"/>
               <a:pPr/>
-              <a:t>‹#›</a:t>
+              <a:t>‹Nº›</a:t>
             </a:fld>
             <a:endParaRPr lang="es-AR"/>
           </a:p>
@@ -1189,7 +1189,7 @@
     </p:spTree>
     <p:extLst>
       <p:ext uri="{BB962C8B-B14F-4D97-AF65-F5344CB8AC3E}">
-        <p14:creationId xmlns:p14="http://schemas.microsoft.com/office/powerpoint/2010/main" val="2001868568"/>
+        <p14:creationId xmlns:p14="http://schemas.microsoft.com/office/powerpoint/2010/main" xmlns="" val="2001868568"/>
       </p:ext>
     </p:extLst>
   </p:cSld>
@@ -1427,7 +1427,7 @@
             <a:fld id="{37257250-85BF-4CE9-8829-60D0CC99FEAA}" type="datetimeFigureOut">
               <a:rPr lang="es-AR" smtClean="0"/>
               <a:pPr/>
-              <a:t>15/09/2013</a:t>
+              <a:t>16/09/2013</a:t>
             </a:fld>
             <a:endParaRPr lang="es-AR"/>
           </a:p>
@@ -1470,7 +1470,7 @@
             <a:fld id="{5D54C5B7-6535-45F6-B87D-0A10CE9C57BD}" type="slidenum">
               <a:rPr lang="es-AR" smtClean="0"/>
               <a:pPr/>
-              <a:t>‹#›</a:t>
+              <a:t>‹Nº›</a:t>
             </a:fld>
             <a:endParaRPr lang="es-AR"/>
           </a:p>
@@ -1479,7 +1479,7 @@
     </p:spTree>
     <p:extLst>
       <p:ext uri="{BB962C8B-B14F-4D97-AF65-F5344CB8AC3E}">
-        <p14:creationId xmlns:p14="http://schemas.microsoft.com/office/powerpoint/2010/main" val="645645608"/>
+        <p14:creationId xmlns:p14="http://schemas.microsoft.com/office/powerpoint/2010/main" xmlns="" val="645645608"/>
       </p:ext>
     </p:extLst>
   </p:cSld>
@@ -1867,7 +1867,7 @@
             <a:fld id="{37257250-85BF-4CE9-8829-60D0CC99FEAA}" type="datetimeFigureOut">
               <a:rPr lang="es-AR" smtClean="0"/>
               <a:pPr/>
-              <a:t>15/09/2013</a:t>
+              <a:t>16/09/2013</a:t>
             </a:fld>
             <a:endParaRPr lang="es-AR"/>
           </a:p>
@@ -1910,7 +1910,7 @@
             <a:fld id="{5D54C5B7-6535-45F6-B87D-0A10CE9C57BD}" type="slidenum">
               <a:rPr lang="es-AR" smtClean="0"/>
               <a:pPr/>
-              <a:t>‹#›</a:t>
+              <a:t>‹Nº›</a:t>
             </a:fld>
             <a:endParaRPr lang="es-AR"/>
           </a:p>
@@ -1919,7 +1919,7 @@
     </p:spTree>
     <p:extLst>
       <p:ext uri="{BB962C8B-B14F-4D97-AF65-F5344CB8AC3E}">
-        <p14:creationId xmlns:p14="http://schemas.microsoft.com/office/powerpoint/2010/main" val="532310638"/>
+        <p14:creationId xmlns:p14="http://schemas.microsoft.com/office/powerpoint/2010/main" xmlns="" val="532310638"/>
       </p:ext>
     </p:extLst>
   </p:cSld>
@@ -1987,7 +1987,7 @@
             <a:fld id="{37257250-85BF-4CE9-8829-60D0CC99FEAA}" type="datetimeFigureOut">
               <a:rPr lang="es-AR" smtClean="0"/>
               <a:pPr/>
-              <a:t>15/09/2013</a:t>
+              <a:t>16/09/2013</a:t>
             </a:fld>
             <a:endParaRPr lang="es-AR"/>
           </a:p>
@@ -2030,7 +2030,7 @@
             <a:fld id="{5D54C5B7-6535-45F6-B87D-0A10CE9C57BD}" type="slidenum">
               <a:rPr lang="es-AR" smtClean="0"/>
               <a:pPr/>
-              <a:t>‹#›</a:t>
+              <a:t>‹Nº›</a:t>
             </a:fld>
             <a:endParaRPr lang="es-AR"/>
           </a:p>
@@ -2039,7 +2039,7 @@
     </p:spTree>
     <p:extLst>
       <p:ext uri="{BB962C8B-B14F-4D97-AF65-F5344CB8AC3E}">
-        <p14:creationId xmlns:p14="http://schemas.microsoft.com/office/powerpoint/2010/main" val="2854672547"/>
+        <p14:creationId xmlns:p14="http://schemas.microsoft.com/office/powerpoint/2010/main" xmlns="" val="2854672547"/>
       </p:ext>
     </p:extLst>
   </p:cSld>
@@ -2084,7 +2084,7 @@
             <a:fld id="{37257250-85BF-4CE9-8829-60D0CC99FEAA}" type="datetimeFigureOut">
               <a:rPr lang="es-AR" smtClean="0"/>
               <a:pPr/>
-              <a:t>15/09/2013</a:t>
+              <a:t>16/09/2013</a:t>
             </a:fld>
             <a:endParaRPr lang="es-AR"/>
           </a:p>
@@ -2127,7 +2127,7 @@
             <a:fld id="{5D54C5B7-6535-45F6-B87D-0A10CE9C57BD}" type="slidenum">
               <a:rPr lang="es-AR" smtClean="0"/>
               <a:pPr/>
-              <a:t>‹#›</a:t>
+              <a:t>‹Nº›</a:t>
             </a:fld>
             <a:endParaRPr lang="es-AR"/>
           </a:p>
@@ -2136,7 +2136,7 @@
     </p:spTree>
     <p:extLst>
       <p:ext uri="{BB962C8B-B14F-4D97-AF65-F5344CB8AC3E}">
-        <p14:creationId xmlns:p14="http://schemas.microsoft.com/office/powerpoint/2010/main" val="1207526025"/>
+        <p14:creationId xmlns:p14="http://schemas.microsoft.com/office/powerpoint/2010/main" xmlns="" val="1207526025"/>
       </p:ext>
     </p:extLst>
   </p:cSld>
@@ -2442,7 +2442,7 @@
             <a:fld id="{37257250-85BF-4CE9-8829-60D0CC99FEAA}" type="datetimeFigureOut">
               <a:rPr lang="es-AR" smtClean="0"/>
               <a:pPr/>
-              <a:t>15/09/2013</a:t>
+              <a:t>16/09/2013</a:t>
             </a:fld>
             <a:endParaRPr lang="es-AR"/>
           </a:p>
@@ -2495,7 +2495,7 @@
             <a:fld id="{5D54C5B7-6535-45F6-B87D-0A10CE9C57BD}" type="slidenum">
               <a:rPr lang="es-AR" smtClean="0"/>
               <a:pPr/>
-              <a:t>‹#›</a:t>
+              <a:t>‹Nº›</a:t>
             </a:fld>
             <a:endParaRPr lang="es-AR"/>
           </a:p>
@@ -2504,7 +2504,7 @@
     </p:spTree>
     <p:extLst>
       <p:ext uri="{BB962C8B-B14F-4D97-AF65-F5344CB8AC3E}">
-        <p14:creationId xmlns:p14="http://schemas.microsoft.com/office/powerpoint/2010/main" val="692071596"/>
+        <p14:creationId xmlns:p14="http://schemas.microsoft.com/office/powerpoint/2010/main" xmlns="" val="692071596"/>
       </p:ext>
     </p:extLst>
   </p:cSld>
@@ -2763,7 +2763,7 @@
             <a:fld id="{37257250-85BF-4CE9-8829-60D0CC99FEAA}" type="datetimeFigureOut">
               <a:rPr lang="es-AR" smtClean="0"/>
               <a:pPr/>
-              <a:t>15/09/2013</a:t>
+              <a:t>16/09/2013</a:t>
             </a:fld>
             <a:endParaRPr lang="es-AR"/>
           </a:p>
@@ -2826,7 +2826,7 @@
             <a:fld id="{5D54C5B7-6535-45F6-B87D-0A10CE9C57BD}" type="slidenum">
               <a:rPr lang="es-AR" smtClean="0"/>
               <a:pPr/>
-              <a:t>‹#›</a:t>
+              <a:t>‹Nº›</a:t>
             </a:fld>
             <a:endParaRPr lang="es-AR"/>
           </a:p>
@@ -2835,7 +2835,7 @@
     </p:spTree>
     <p:extLst>
       <p:ext uri="{BB962C8B-B14F-4D97-AF65-F5344CB8AC3E}">
-        <p14:creationId xmlns:p14="http://schemas.microsoft.com/office/powerpoint/2010/main" val="975840812"/>
+        <p14:creationId xmlns:p14="http://schemas.microsoft.com/office/powerpoint/2010/main" xmlns="" val="975840812"/>
       </p:ext>
     </p:extLst>
   </p:cSld>
@@ -2998,7 +2998,7 @@
             <a:fld id="{37257250-85BF-4CE9-8829-60D0CC99FEAA}" type="datetimeFigureOut">
               <a:rPr lang="es-AR" smtClean="0"/>
               <a:pPr/>
-              <a:t>15/09/2013</a:t>
+              <a:t>16/09/2013</a:t>
             </a:fld>
             <a:endParaRPr lang="es-AR"/>
           </a:p>
@@ -3081,7 +3081,7 @@
             <a:fld id="{5D54C5B7-6535-45F6-B87D-0A10CE9C57BD}" type="slidenum">
               <a:rPr lang="es-AR" smtClean="0"/>
               <a:pPr/>
-              <a:t>‹#›</a:t>
+              <a:t>‹Nº›</a:t>
             </a:fld>
             <a:endParaRPr lang="es-AR"/>
           </a:p>
@@ -3090,7 +3090,7 @@
     </p:spTree>
     <p:extLst>
       <p:ext uri="{BB962C8B-B14F-4D97-AF65-F5344CB8AC3E}">
-        <p14:creationId xmlns:p14="http://schemas.microsoft.com/office/powerpoint/2010/main" val="4148694763"/>
+        <p14:creationId xmlns:p14="http://schemas.microsoft.com/office/powerpoint/2010/main" xmlns="" val="4148694763"/>
       </p:ext>
     </p:extLst>
   </p:cSld>
@@ -3642,11 +3642,7 @@
             <a:pPr algn="ctr"/>
             <a:r>
               <a:rPr lang="es-AR" dirty="0" smtClean="0"/>
-              <a:t>Lecciones </a:t>
-            </a:r>
-            <a:r>
-              <a:rPr lang="es-AR" dirty="0" smtClean="0"/>
-              <a:t>Aprendidas</a:t>
+              <a:t>Lecciones Aprendidas</a:t>
             </a:r>
             <a:endParaRPr lang="es-AR" dirty="0"/>
           </a:p>
@@ -3681,11 +3677,7 @@
             </a:r>
             <a:r>
               <a:rPr lang="es-AR" dirty="0" smtClean="0"/>
-              <a:t> con nuevas tecnologías (Android </a:t>
-            </a:r>
-            <a:r>
-              <a:rPr lang="es-AR" dirty="0" smtClean="0"/>
-              <a:t>Studio + </a:t>
+              <a:t> con nuevas tecnologías (Android Studio + </a:t>
             </a:r>
             <a:r>
               <a:rPr lang="es-AR" dirty="0" err="1" smtClean="0"/>
@@ -4014,11 +4006,7 @@
             </a:r>
             <a:r>
               <a:rPr lang="es-AR" dirty="0" smtClean="0"/>
-              <a:t> </a:t>
-            </a:r>
-            <a:r>
-              <a:rPr lang="es-AR" dirty="0" smtClean="0"/>
-              <a:t>Chart	</a:t>
+              <a:t> Chart	</a:t>
             </a:r>
             <a:endParaRPr lang="es-AR" dirty="0"/>
           </a:p>
@@ -4274,7 +4262,7 @@
     </p:spTree>
     <p:extLst>
       <p:ext uri="{BB962C8B-B14F-4D97-AF65-F5344CB8AC3E}">
-        <p14:creationId xmlns:p14="http://schemas.microsoft.com/office/powerpoint/2010/main" val="1048836659"/>
+        <p14:creationId xmlns:p14="http://schemas.microsoft.com/office/powerpoint/2010/main" xmlns="" val="1048836659"/>
       </p:ext>
     </p:extLst>
   </p:cSld>
@@ -4412,7 +4400,7 @@
     </p:spTree>
     <p:extLst>
       <p:ext uri="{BB962C8B-B14F-4D97-AF65-F5344CB8AC3E}">
-        <p14:creationId xmlns:p14="http://schemas.microsoft.com/office/powerpoint/2010/main" val="3159891781"/>
+        <p14:creationId xmlns:p14="http://schemas.microsoft.com/office/powerpoint/2010/main" xmlns="" val="3159891781"/>
       </p:ext>
     </p:extLst>
   </p:cSld>
@@ -4555,11 +4543,7 @@
             <a:pPr algn="ctr"/>
             <a:r>
               <a:rPr lang="es-AR" dirty="0" smtClean="0"/>
-              <a:t>Pruebas </a:t>
-            </a:r>
-            <a:r>
-              <a:rPr lang="es-AR" dirty="0" smtClean="0"/>
-              <a:t>Funcionales</a:t>
+              <a:t>Pruebas Funcionales</a:t>
             </a:r>
             <a:endParaRPr lang="es-AR" dirty="0"/>
           </a:p>
@@ -4567,7 +4551,7 @@
       </p:sp>
       <p:pic>
         <p:nvPicPr>
-          <p:cNvPr id="1026" name="Picture 2"/>
+          <p:cNvPr id="3" name="Picture 2"/>
           <p:cNvPicPr>
             <a:picLocks noChangeAspect="1" noChangeArrowheads="1"/>
           </p:cNvPicPr>
@@ -4582,8 +4566,8 @@
         </p:blipFill>
         <p:spPr bwMode="auto">
           <a:xfrm>
-            <a:off x="2143108" y="1844824"/>
-            <a:ext cx="4857784" cy="3469845"/>
+            <a:off x="214282" y="1928802"/>
+            <a:ext cx="8672519" cy="3714776"/>
           </a:xfrm>
           <a:prstGeom prst="rect">
             <a:avLst/>
@@ -4656,7 +4640,7 @@
     </a:clrScheme>
     <a:fontScheme name="Metropolitan">
       <a:majorFont>
-        <a:latin typeface="Calibri Light" panose="020F0302020204030204"/>
+        <a:latin typeface="Calibri Light"/>
         <a:ea typeface=""/>
         <a:cs typeface=""/>
         <a:font script="Jpan" typeface="ＭＳ Ｐゴシック"/>
@@ -4691,7 +4675,7 @@
         <a:font script="Geor" typeface="Sylfaen"/>
       </a:majorFont>
       <a:minorFont>
-        <a:latin typeface="Calibri Light" panose="020F0302020204030204"/>
+        <a:latin typeface="Calibri Light"/>
         <a:ea typeface=""/>
         <a:cs typeface=""/>
         <a:font script="Jpan" typeface="ＭＳ Ｐゴシック"/>
@@ -4844,7 +4828,7 @@
   <a:extraClrSchemeLst/>
   <a:extLst>
     <a:ext uri="{05A4C25C-085E-4340-85A3-A5531E510DB2}">
-      <thm15:themeFamily xmlns:thm15="http://schemas.microsoft.com/office/thememl/2012/main" name="Metropolitan" id="{4C5440D6-04D2-4954-96CF-F251137069B2}" vid="{79CFCA13-9412-4290-BB4B-85112F88857B}"/>
+      <thm15:themeFamily xmlns:thm15="http://schemas.microsoft.com/office/thememl/2012/main" xmlns="" name="Metropolitan" id="{4C5440D6-04D2-4954-96CF-F251137069B2}" vid="{79CFCA13-9412-4290-BB4B-85112F88857B}"/>
     </a:ext>
   </a:extLst>
 </a:theme>

</xml_diff>

<commit_message>
# Item 163. Bug fix
</commit_message>
<xml_diff>
--- a/docs/Reuniones/Sprint 1/Sprint 1 - Formal/Presentacion.pptx
+++ b/docs/Reuniones/Sprint 1/Sprint 1 - Formal/Presentacion.pptx
@@ -115,7 +115,7 @@
   </p:defaultTextStyle>
   <p:extLst>
     <p:ext uri="{EFAFB233-063F-42B5-8137-9DF3F51BA10A}">
-      <p15:sldGuideLst xmlns:p15="http://schemas.microsoft.com/office/powerpoint/2012/main" xmlns="">
+      <p15:sldGuideLst xmlns:p15="http://schemas.microsoft.com/office/powerpoint/2012/main">
         <p15:guide id="1" orient="horz" pos="2160">
           <p15:clr>
             <a:srgbClr val="A4A3A4"/>
@@ -396,7 +396,7 @@
             <a:fld id="{5D54C5B7-6535-45F6-B87D-0A10CE9C57BD}" type="slidenum">
               <a:rPr lang="es-AR" smtClean="0"/>
               <a:pPr/>
-              <a:t>‹Nº›</a:t>
+              <a:t>‹#›</a:t>
             </a:fld>
             <a:endParaRPr lang="es-AR"/>
           </a:p>
@@ -405,7 +405,7 @@
     </p:spTree>
     <p:extLst>
       <p:ext uri="{BB962C8B-B14F-4D97-AF65-F5344CB8AC3E}">
-        <p14:creationId xmlns:p14="http://schemas.microsoft.com/office/powerpoint/2010/main" xmlns="" val="2387916325"/>
+        <p14:creationId xmlns:p14="http://schemas.microsoft.com/office/powerpoint/2010/main" val="2387916325"/>
       </p:ext>
     </p:extLst>
   </p:cSld>
@@ -568,7 +568,7 @@
             <a:fld id="{5D54C5B7-6535-45F6-B87D-0A10CE9C57BD}" type="slidenum">
               <a:rPr lang="es-AR" smtClean="0"/>
               <a:pPr/>
-              <a:t>‹Nº›</a:t>
+              <a:t>‹#›</a:t>
             </a:fld>
             <a:endParaRPr lang="es-AR"/>
           </a:p>
@@ -577,7 +577,7 @@
     </p:spTree>
     <p:extLst>
       <p:ext uri="{BB962C8B-B14F-4D97-AF65-F5344CB8AC3E}">
-        <p14:creationId xmlns:p14="http://schemas.microsoft.com/office/powerpoint/2010/main" xmlns="" val="599926953"/>
+        <p14:creationId xmlns:p14="http://schemas.microsoft.com/office/powerpoint/2010/main" val="599926953"/>
       </p:ext>
     </p:extLst>
   </p:cSld>
@@ -750,7 +750,7 @@
             <a:fld id="{5D54C5B7-6535-45F6-B87D-0A10CE9C57BD}" type="slidenum">
               <a:rPr lang="es-AR" smtClean="0"/>
               <a:pPr/>
-              <a:t>‹Nº›</a:t>
+              <a:t>‹#›</a:t>
             </a:fld>
             <a:endParaRPr lang="es-AR"/>
           </a:p>
@@ -759,7 +759,7 @@
     </p:spTree>
     <p:extLst>
       <p:ext uri="{BB962C8B-B14F-4D97-AF65-F5344CB8AC3E}">
-        <p14:creationId xmlns:p14="http://schemas.microsoft.com/office/powerpoint/2010/main" xmlns="" val="1132530867"/>
+        <p14:creationId xmlns:p14="http://schemas.microsoft.com/office/powerpoint/2010/main" val="1132530867"/>
       </p:ext>
     </p:extLst>
   </p:cSld>
@@ -922,7 +922,7 @@
             <a:fld id="{5D54C5B7-6535-45F6-B87D-0A10CE9C57BD}" type="slidenum">
               <a:rPr lang="es-AR" smtClean="0"/>
               <a:pPr/>
-              <a:t>‹Nº›</a:t>
+              <a:t>‹#›</a:t>
             </a:fld>
             <a:endParaRPr lang="es-AR"/>
           </a:p>
@@ -931,7 +931,7 @@
     </p:spTree>
     <p:extLst>
       <p:ext uri="{BB962C8B-B14F-4D97-AF65-F5344CB8AC3E}">
-        <p14:creationId xmlns:p14="http://schemas.microsoft.com/office/powerpoint/2010/main" xmlns="" val="3486428753"/>
+        <p14:creationId xmlns:p14="http://schemas.microsoft.com/office/powerpoint/2010/main" val="3486428753"/>
       </p:ext>
     </p:extLst>
   </p:cSld>
@@ -1180,7 +1180,7 @@
             <a:fld id="{5D54C5B7-6535-45F6-B87D-0A10CE9C57BD}" type="slidenum">
               <a:rPr lang="es-AR" smtClean="0"/>
               <a:pPr/>
-              <a:t>‹Nº›</a:t>
+              <a:t>‹#›</a:t>
             </a:fld>
             <a:endParaRPr lang="es-AR"/>
           </a:p>
@@ -1189,7 +1189,7 @@
     </p:spTree>
     <p:extLst>
       <p:ext uri="{BB962C8B-B14F-4D97-AF65-F5344CB8AC3E}">
-        <p14:creationId xmlns:p14="http://schemas.microsoft.com/office/powerpoint/2010/main" xmlns="" val="2001868568"/>
+        <p14:creationId xmlns:p14="http://schemas.microsoft.com/office/powerpoint/2010/main" val="2001868568"/>
       </p:ext>
     </p:extLst>
   </p:cSld>
@@ -1470,7 +1470,7 @@
             <a:fld id="{5D54C5B7-6535-45F6-B87D-0A10CE9C57BD}" type="slidenum">
               <a:rPr lang="es-AR" smtClean="0"/>
               <a:pPr/>
-              <a:t>‹Nº›</a:t>
+              <a:t>‹#›</a:t>
             </a:fld>
             <a:endParaRPr lang="es-AR"/>
           </a:p>
@@ -1479,7 +1479,7 @@
     </p:spTree>
     <p:extLst>
       <p:ext uri="{BB962C8B-B14F-4D97-AF65-F5344CB8AC3E}">
-        <p14:creationId xmlns:p14="http://schemas.microsoft.com/office/powerpoint/2010/main" xmlns="" val="645645608"/>
+        <p14:creationId xmlns:p14="http://schemas.microsoft.com/office/powerpoint/2010/main" val="645645608"/>
       </p:ext>
     </p:extLst>
   </p:cSld>
@@ -1910,7 +1910,7 @@
             <a:fld id="{5D54C5B7-6535-45F6-B87D-0A10CE9C57BD}" type="slidenum">
               <a:rPr lang="es-AR" smtClean="0"/>
               <a:pPr/>
-              <a:t>‹Nº›</a:t>
+              <a:t>‹#›</a:t>
             </a:fld>
             <a:endParaRPr lang="es-AR"/>
           </a:p>
@@ -1919,7 +1919,7 @@
     </p:spTree>
     <p:extLst>
       <p:ext uri="{BB962C8B-B14F-4D97-AF65-F5344CB8AC3E}">
-        <p14:creationId xmlns:p14="http://schemas.microsoft.com/office/powerpoint/2010/main" xmlns="" val="532310638"/>
+        <p14:creationId xmlns:p14="http://schemas.microsoft.com/office/powerpoint/2010/main" val="532310638"/>
       </p:ext>
     </p:extLst>
   </p:cSld>
@@ -2030,7 +2030,7 @@
             <a:fld id="{5D54C5B7-6535-45F6-B87D-0A10CE9C57BD}" type="slidenum">
               <a:rPr lang="es-AR" smtClean="0"/>
               <a:pPr/>
-              <a:t>‹Nº›</a:t>
+              <a:t>‹#›</a:t>
             </a:fld>
             <a:endParaRPr lang="es-AR"/>
           </a:p>
@@ -2039,7 +2039,7 @@
     </p:spTree>
     <p:extLst>
       <p:ext uri="{BB962C8B-B14F-4D97-AF65-F5344CB8AC3E}">
-        <p14:creationId xmlns:p14="http://schemas.microsoft.com/office/powerpoint/2010/main" xmlns="" val="2854672547"/>
+        <p14:creationId xmlns:p14="http://schemas.microsoft.com/office/powerpoint/2010/main" val="2854672547"/>
       </p:ext>
     </p:extLst>
   </p:cSld>
@@ -2127,7 +2127,7 @@
             <a:fld id="{5D54C5B7-6535-45F6-B87D-0A10CE9C57BD}" type="slidenum">
               <a:rPr lang="es-AR" smtClean="0"/>
               <a:pPr/>
-              <a:t>‹Nº›</a:t>
+              <a:t>‹#›</a:t>
             </a:fld>
             <a:endParaRPr lang="es-AR"/>
           </a:p>
@@ -2136,7 +2136,7 @@
     </p:spTree>
     <p:extLst>
       <p:ext uri="{BB962C8B-B14F-4D97-AF65-F5344CB8AC3E}">
-        <p14:creationId xmlns:p14="http://schemas.microsoft.com/office/powerpoint/2010/main" xmlns="" val="1207526025"/>
+        <p14:creationId xmlns:p14="http://schemas.microsoft.com/office/powerpoint/2010/main" val="1207526025"/>
       </p:ext>
     </p:extLst>
   </p:cSld>
@@ -2495,7 +2495,7 @@
             <a:fld id="{5D54C5B7-6535-45F6-B87D-0A10CE9C57BD}" type="slidenum">
               <a:rPr lang="es-AR" smtClean="0"/>
               <a:pPr/>
-              <a:t>‹Nº›</a:t>
+              <a:t>‹#›</a:t>
             </a:fld>
             <a:endParaRPr lang="es-AR"/>
           </a:p>
@@ -2504,7 +2504,7 @@
     </p:spTree>
     <p:extLst>
       <p:ext uri="{BB962C8B-B14F-4D97-AF65-F5344CB8AC3E}">
-        <p14:creationId xmlns:p14="http://schemas.microsoft.com/office/powerpoint/2010/main" xmlns="" val="692071596"/>
+        <p14:creationId xmlns:p14="http://schemas.microsoft.com/office/powerpoint/2010/main" val="692071596"/>
       </p:ext>
     </p:extLst>
   </p:cSld>
@@ -2826,7 +2826,7 @@
             <a:fld id="{5D54C5B7-6535-45F6-B87D-0A10CE9C57BD}" type="slidenum">
               <a:rPr lang="es-AR" smtClean="0"/>
               <a:pPr/>
-              <a:t>‹Nº›</a:t>
+              <a:t>‹#›</a:t>
             </a:fld>
             <a:endParaRPr lang="es-AR"/>
           </a:p>
@@ -2835,7 +2835,7 @@
     </p:spTree>
     <p:extLst>
       <p:ext uri="{BB962C8B-B14F-4D97-AF65-F5344CB8AC3E}">
-        <p14:creationId xmlns:p14="http://schemas.microsoft.com/office/powerpoint/2010/main" xmlns="" val="975840812"/>
+        <p14:creationId xmlns:p14="http://schemas.microsoft.com/office/powerpoint/2010/main" val="975840812"/>
       </p:ext>
     </p:extLst>
   </p:cSld>
@@ -3081,7 +3081,7 @@
             <a:fld id="{5D54C5B7-6535-45F6-B87D-0A10CE9C57BD}" type="slidenum">
               <a:rPr lang="es-AR" smtClean="0"/>
               <a:pPr/>
-              <a:t>‹Nº›</a:t>
+              <a:t>‹#›</a:t>
             </a:fld>
             <a:endParaRPr lang="es-AR"/>
           </a:p>
@@ -3090,7 +3090,7 @@
     </p:spTree>
     <p:extLst>
       <p:ext uri="{BB962C8B-B14F-4D97-AF65-F5344CB8AC3E}">
-        <p14:creationId xmlns:p14="http://schemas.microsoft.com/office/powerpoint/2010/main" xmlns="" val="4148694763"/>
+        <p14:creationId xmlns:p14="http://schemas.microsoft.com/office/powerpoint/2010/main" val="4148694763"/>
       </p:ext>
     </p:extLst>
   </p:cSld>
@@ -3547,7 +3547,7 @@
             </a:r>
             <a:r>
               <a:rPr lang="es-AR" dirty="0" err="1" smtClean="0"/>
-              <a:t>Sebastían</a:t>
+              <a:t>Sebastian</a:t>
             </a:r>
             <a:endParaRPr lang="es-AR" dirty="0" smtClean="0"/>
           </a:p>
@@ -4262,7 +4262,7 @@
     </p:spTree>
     <p:extLst>
       <p:ext uri="{BB962C8B-B14F-4D97-AF65-F5344CB8AC3E}">
-        <p14:creationId xmlns:p14="http://schemas.microsoft.com/office/powerpoint/2010/main" xmlns="" val="1048836659"/>
+        <p14:creationId xmlns:p14="http://schemas.microsoft.com/office/powerpoint/2010/main" val="1048836659"/>
       </p:ext>
     </p:extLst>
   </p:cSld>
@@ -4400,7 +4400,7 @@
     </p:spTree>
     <p:extLst>
       <p:ext uri="{BB962C8B-B14F-4D97-AF65-F5344CB8AC3E}">
-        <p14:creationId xmlns:p14="http://schemas.microsoft.com/office/powerpoint/2010/main" xmlns="" val="3159891781"/>
+        <p14:creationId xmlns:p14="http://schemas.microsoft.com/office/powerpoint/2010/main" val="3159891781"/>
       </p:ext>
     </p:extLst>
   </p:cSld>
@@ -4828,7 +4828,7 @@
   <a:extraClrSchemeLst/>
   <a:extLst>
     <a:ext uri="{05A4C25C-085E-4340-85A3-A5531E510DB2}">
-      <thm15:themeFamily xmlns:thm15="http://schemas.microsoft.com/office/thememl/2012/main" xmlns="" name="Metropolitan" id="{4C5440D6-04D2-4954-96CF-F251137069B2}" vid="{79CFCA13-9412-4290-BB4B-85112F88857B}"/>
+      <thm15:themeFamily xmlns:thm15="http://schemas.microsoft.com/office/thememl/2012/main" name="Metropolitan" id="{4C5440D6-04D2-4954-96CF-F251137069B2}" vid="{79CFCA13-9412-4290-BB4B-85112F88857B}"/>
     </a:ext>
   </a:extLst>
 </a:theme>

</xml_diff>